<commit_message>
Envoy presentation slide cleanup
</commit_message>
<xml_diff>
--- a/EnvoyDemo/Envoy.pptx
+++ b/EnvoyDemo/Envoy.pptx
@@ -16,8 +16,7 @@
     <p:sldId id="271" r:id="rId10"/>
     <p:sldId id="272" r:id="rId11"/>
     <p:sldId id="273" r:id="rId12"/>
-    <p:sldId id="274" r:id="rId13"/>
-    <p:sldId id="261" r:id="rId14"/>
+    <p:sldId id="261" r:id="rId13"/>
   </p:sldIdLst>
   <p:sldSz cx="12192000" cy="6858000"/>
   <p:notesSz cx="6858000" cy="9144000"/>
@@ -116,6 +115,11 @@
       </a:defRPr>
     </a:lvl9pPr>
   </p:defaultTextStyle>
+  <p:extLst>
+    <p:ext uri="{EFAFB233-063F-42B5-8137-9DF3F51BA10A}">
+      <p15:sldGuideLst xmlns:p15="http://schemas.microsoft.com/office/powerpoint/2012/main"/>
+    </p:ext>
+  </p:extLst>
 </p:presentation>
 </file>
 
@@ -214,7 +218,7 @@
           <a:effectLst/>
           <a:extLst>
             <a:ext uri="{91240B29-F687-4f45-9708-019B960494DF}">
-              <a14:hiddenLine xmlns="" xmlns:a14="http://schemas.microsoft.com/office/drawing/2010/main" w="9525">
+              <a14:hiddenLine xmlns:a14="http://schemas.microsoft.com/office/drawing/2010/main" xmlns="" w="9525">
                 <a:solidFill>
                   <a:srgbClr val="000000"/>
                 </a:solidFill>
@@ -1724,7 +1728,7 @@
           <a:ln/>
           <a:extLst>
             <a:ext uri="{91240B29-F687-4f45-9708-019B960494DF}">
-              <a14:hiddenLine xmlns="" xmlns:a14="http://schemas.microsoft.com/office/drawing/2010/main" w="9525">
+              <a14:hiddenLine xmlns:a14="http://schemas.microsoft.com/office/drawing/2010/main" xmlns="" w="9525">
                 <a:solidFill>
                   <a:srgbClr val="000000"/>
                 </a:solidFill>
@@ -1996,7 +2000,7 @@
           <a:ln/>
           <a:extLst>
             <a:ext uri="{91240B29-F687-4f45-9708-019B960494DF}">
-              <a14:hiddenLine xmlns="" xmlns:a14="http://schemas.microsoft.com/office/drawing/2010/main" w="9525">
+              <a14:hiddenLine xmlns:a14="http://schemas.microsoft.com/office/drawing/2010/main" xmlns="" w="9525">
                 <a:solidFill>
                   <a:srgbClr val="000000"/>
                 </a:solidFill>
@@ -2276,7 +2280,7 @@
           <a:ln/>
           <a:extLst>
             <a:ext uri="{91240B29-F687-4f45-9708-019B960494DF}">
-              <a14:hiddenLine xmlns="" xmlns:a14="http://schemas.microsoft.com/office/drawing/2010/main" w="9525">
+              <a14:hiddenLine xmlns:a14="http://schemas.microsoft.com/office/drawing/2010/main" xmlns="" w="9525">
                 <a:solidFill>
                   <a:srgbClr val="000000"/>
                 </a:solidFill>
@@ -2896,7 +2900,7 @@
           <a:ln/>
           <a:extLst>
             <a:ext uri="{91240B29-F687-4f45-9708-019B960494DF}">
-              <a14:hiddenLine xmlns="" xmlns:a14="http://schemas.microsoft.com/office/drawing/2010/main" w="9525">
+              <a14:hiddenLine xmlns:a14="http://schemas.microsoft.com/office/drawing/2010/main" xmlns="" w="9525">
                 <a:solidFill>
                   <a:srgbClr val="000000"/>
                 </a:solidFill>
@@ -3232,7 +3236,7 @@
           <a:ln/>
           <a:extLst>
             <a:ext uri="{91240B29-F687-4f45-9708-019B960494DF}">
-              <a14:hiddenLine xmlns="" xmlns:a14="http://schemas.microsoft.com/office/drawing/2010/main" w="9525">
+              <a14:hiddenLine xmlns:a14="http://schemas.microsoft.com/office/drawing/2010/main" xmlns="" w="9525">
                 <a:solidFill>
                   <a:srgbClr val="000000"/>
                 </a:solidFill>
@@ -3706,7 +3710,7 @@
           <a:ln/>
           <a:extLst>
             <a:ext uri="{91240B29-F687-4f45-9708-019B960494DF}">
-              <a14:hiddenLine xmlns="" xmlns:a14="http://schemas.microsoft.com/office/drawing/2010/main" w="9525">
+              <a14:hiddenLine xmlns:a14="http://schemas.microsoft.com/office/drawing/2010/main" xmlns="" w="9525">
                 <a:solidFill>
                   <a:srgbClr val="000000"/>
                 </a:solidFill>
@@ -4129,7 +4133,7 @@
           <a:ln/>
           <a:extLst>
             <a:ext uri="{91240B29-F687-4f45-9708-019B960494DF}">
-              <a14:hiddenLine xmlns="" xmlns:a14="http://schemas.microsoft.com/office/drawing/2010/main" w="9525">
+              <a14:hiddenLine xmlns:a14="http://schemas.microsoft.com/office/drawing/2010/main" xmlns="" w="9525">
                 <a:solidFill>
                   <a:srgbClr val="000000"/>
                 </a:solidFill>
@@ -6492,36 +6496,6 @@
 </file>
 
 <file path=ppt/slides/slide12.xml><?xml version="1.0" encoding="utf-8"?>
-<p:sld xmlns:a="http://schemas.openxmlformats.org/drawingml/2006/main" xmlns:r="http://schemas.openxmlformats.org/officeDocument/2006/relationships" xmlns:p="http://schemas.openxmlformats.org/presentationml/2006/main">
-  <p:cSld>
-    <p:spTree>
-      <p:nvGrpSpPr>
-        <p:cNvPr id="1" name=""/>
-        <p:cNvGrpSpPr/>
-        <p:nvPr/>
-      </p:nvGrpSpPr>
-      <p:grpSpPr>
-        <a:xfrm>
-          <a:off x="0" y="0"/>
-          <a:ext cx="0" cy="0"/>
-          <a:chOff x="0" y="0"/>
-          <a:chExt cx="0" cy="0"/>
-        </a:xfrm>
-      </p:grpSpPr>
-    </p:spTree>
-    <p:extLst>
-      <p:ext uri="{BB962C8B-B14F-4D97-AF65-F5344CB8AC3E}">
-        <p14:creationId xmlns:p14="http://schemas.microsoft.com/office/powerpoint/2010/main" val="4262970764"/>
-      </p:ext>
-    </p:extLst>
-  </p:cSld>
-  <p:clrMapOvr>
-    <a:masterClrMapping/>
-  </p:clrMapOvr>
-</p:sld>
-</file>
-
-<file path=ppt/slides/slide13.xml><?xml version="1.0" encoding="utf-8"?>
 <p:sld xmlns:a="http://schemas.openxmlformats.org/drawingml/2006/main" xmlns:r="http://schemas.openxmlformats.org/officeDocument/2006/relationships" xmlns:p="http://schemas.openxmlformats.org/presentationml/2006/main">
   <p:cSld>
     <p:spTree>

</xml_diff>